<commit_message>
update 3 cases for parsers.
</commit_message>
<xml_diff>
--- a/doc/CookCC.pptx
+++ b/doc/CookCC.pptx
@@ -2,10 +2,10 @@
 <file path=ppt/presentation.xml><?xml version="1.0" encoding="utf-8"?>
 <p:presentation xmlns:a="http://schemas.openxmlformats.org/drawingml/2006/main" xmlns:r="http://schemas.openxmlformats.org/officeDocument/2006/relationships" xmlns:p="http://schemas.openxmlformats.org/presentationml/2006/main" saveSubsetFonts="1" bookmarkIdSeed="2">
   <p:sldMasterIdLst>
-    <p:sldMasterId id="2147483672" r:id="rId1"/>
+    <p:sldMasterId id="2147483744" r:id="rId1"/>
   </p:sldMasterIdLst>
   <p:notesMasterIdLst>
-    <p:notesMasterId r:id="rId28"/>
+    <p:notesMasterId r:id="rId31"/>
   </p:notesMasterIdLst>
   <p:sldIdLst>
     <p:sldId id="256" r:id="rId2"/>
@@ -27,13 +27,16 @@
     <p:sldId id="262" r:id="rId18"/>
     <p:sldId id="263" r:id="rId19"/>
     <p:sldId id="264" r:id="rId20"/>
-    <p:sldId id="277" r:id="rId21"/>
-    <p:sldId id="280" r:id="rId22"/>
-    <p:sldId id="265" r:id="rId23"/>
-    <p:sldId id="278" r:id="rId24"/>
-    <p:sldId id="279" r:id="rId25"/>
-    <p:sldId id="270" r:id="rId26"/>
-    <p:sldId id="281" r:id="rId27"/>
+    <p:sldId id="282" r:id="rId21"/>
+    <p:sldId id="283" r:id="rId22"/>
+    <p:sldId id="284" r:id="rId23"/>
+    <p:sldId id="277" r:id="rId24"/>
+    <p:sldId id="280" r:id="rId25"/>
+    <p:sldId id="265" r:id="rId26"/>
+    <p:sldId id="278" r:id="rId27"/>
+    <p:sldId id="279" r:id="rId28"/>
+    <p:sldId id="270" r:id="rId29"/>
+    <p:sldId id="281" r:id="rId30"/>
   </p:sldIdLst>
   <p:sldSz cx="9144000" cy="6858000" type="screen4x3"/>
   <p:notesSz cx="6858000" cy="9144000"/>
@@ -217,6 +220,7 @@
           <a:p>
             <a:fld id="{A82CFD9B-D8EE-4E0F-BE6A-83EBD460068A}" type="datetimeFigureOut">
               <a:rPr lang="en-US" smtClean="0"/>
+              <a:pPr/>
               <a:t>12/5/2008</a:t>
             </a:fld>
             <a:endParaRPr lang="en-US"/>
@@ -378,6 +382,7 @@
           <a:p>
             <a:fld id="{7EC254F2-6B53-4ED3-A557-531AFB272293}" type="slidenum">
               <a:rPr lang="en-US" smtClean="0"/>
+              <a:pPr/>
               <a:t>‹#›</a:t>
             </a:fld>
             <a:endParaRPr lang="en-US"/>
@@ -549,6 +554,7 @@
           <a:p>
             <a:fld id="{7EC254F2-6B53-4ED3-A557-531AFB272293}" type="slidenum">
               <a:rPr lang="en-US" smtClean="0"/>
+              <a:pPr/>
               <a:t>4</a:t>
             </a:fld>
             <a:endParaRPr lang="en-US"/>
@@ -3960,17 +3966,17 @@
   </p:cSld>
   <p:clrMap bg1="lt1" tx1="dk1" bg2="lt2" tx2="dk2" accent1="accent1" accent2="accent2" accent3="accent3" accent4="accent4" accent5="accent5" accent6="accent6" hlink="hlink" folHlink="folHlink"/>
   <p:sldLayoutIdLst>
-    <p:sldLayoutId id="2147483673" r:id="rId1"/>
-    <p:sldLayoutId id="2147483674" r:id="rId2"/>
-    <p:sldLayoutId id="2147483675" r:id="rId3"/>
-    <p:sldLayoutId id="2147483676" r:id="rId4"/>
-    <p:sldLayoutId id="2147483677" r:id="rId5"/>
-    <p:sldLayoutId id="2147483678" r:id="rId6"/>
-    <p:sldLayoutId id="2147483679" r:id="rId7"/>
-    <p:sldLayoutId id="2147483680" r:id="rId8"/>
-    <p:sldLayoutId id="2147483681" r:id="rId9"/>
-    <p:sldLayoutId id="2147483682" r:id="rId10"/>
-    <p:sldLayoutId id="2147483683" r:id="rId11"/>
+    <p:sldLayoutId id="2147483745" r:id="rId1"/>
+    <p:sldLayoutId id="2147483746" r:id="rId2"/>
+    <p:sldLayoutId id="2147483747" r:id="rId3"/>
+    <p:sldLayoutId id="2147483748" r:id="rId4"/>
+    <p:sldLayoutId id="2147483749" r:id="rId5"/>
+    <p:sldLayoutId id="2147483750" r:id="rId6"/>
+    <p:sldLayoutId id="2147483751" r:id="rId7"/>
+    <p:sldLayoutId id="2147483752" r:id="rId8"/>
+    <p:sldLayoutId id="2147483753" r:id="rId9"/>
+    <p:sldLayoutId id="2147483754" r:id="rId10"/>
+    <p:sldLayoutId id="2147483755" r:id="rId11"/>
   </p:sldLayoutIdLst>
   <p:txStyles>
     <p:titleStyle>
@@ -4297,11 +4303,7 @@
             </a:r>
             <a:r>
               <a:rPr lang="en-US" dirty="0" smtClean="0"/>
-              <a:t> / Parse </a:t>
-            </a:r>
-            <a:r>
-              <a:rPr lang="en-US" dirty="0" smtClean="0"/>
-              <a:t>the Easy Way</a:t>
+              <a:t> / Parse the Easy Way</a:t>
             </a:r>
             <a:endParaRPr lang="en-US" dirty="0"/>
           </a:p>
@@ -4387,11 +4389,7 @@
             </a:r>
             <a:r>
               <a:rPr lang="en-US" dirty="0" smtClean="0"/>
-              <a:t> </a:t>
-            </a:r>
-            <a:r>
-              <a:rPr lang="en-US" dirty="0" smtClean="0"/>
-              <a:t>Java Annotation Input</a:t>
+              <a:t> Java Annotation Input</a:t>
             </a:r>
             <a:endParaRPr lang="en-US" dirty="0"/>
           </a:p>
@@ -4860,15 +4858,14 @@
         </p:nvPicPr>
         <p:blipFill>
           <a:blip r:embed="rId2"/>
-          <a:srcRect/>
           <a:stretch>
             <a:fillRect/>
           </a:stretch>
         </p:blipFill>
         <p:spPr bwMode="auto">
           <a:xfrm>
-            <a:off x="5029200" y="2590800"/>
-            <a:ext cx="3551458" cy="2242344"/>
+            <a:off x="5362575" y="3261519"/>
+            <a:ext cx="2609850" cy="1647825"/>
           </a:xfrm>
           <a:prstGeom prst="rect">
             <a:avLst/>
@@ -5217,19 +5214,7 @@
             </a:r>
             <a:r>
               <a:rPr lang="en-US" dirty="0" smtClean="0"/>
-              <a:t> would call this function and then move on to </a:t>
-            </a:r>
-            <a:r>
-              <a:rPr lang="en-US" dirty="0" smtClean="0"/>
-              <a:t>match </a:t>
-            </a:r>
-            <a:r>
-              <a:rPr lang="en-US" dirty="0" smtClean="0"/>
-              <a:t>the next potential pattern</a:t>
-            </a:r>
-            <a:r>
-              <a:rPr lang="en-US" dirty="0" smtClean="0"/>
-              <a:t>.</a:t>
+              <a:t> would call this function and then move on to match the next potential pattern.</a:t>
             </a:r>
           </a:p>
         </p:txBody>
@@ -5504,13 +5489,8 @@
             </a:r>
             <a:r>
               <a:rPr lang="en-US" dirty="0" smtClean="0"/>
-              <a:t> would return the value immediately</a:t>
-            </a:r>
-            <a:r>
-              <a:rPr lang="en-US" dirty="0" smtClean="0"/>
-              <a:t>.</a:t>
-            </a:r>
-            <a:endParaRPr lang="en-US" dirty="0" smtClean="0"/>
+              <a:t> would return the value immediately.</a:t>
+            </a:r>
           </a:p>
         </p:txBody>
       </p:sp>
@@ -6008,73 +5988,78 @@
         </p:spPr>
         <p:txBody>
           <a:bodyPr>
-            <a:normAutofit/>
+            <a:normAutofit fontScale="77500" lnSpcReduction="20000"/>
           </a:bodyPr>
           <a:lstStyle/>
           <a:p>
-            <a:r>
-              <a:rPr lang="en-US" sz="1600" dirty="0" smtClean="0"/>
+            <a:pPr rtl="0" eaLnBrk="1" latinLnBrk="0" hangingPunct="1"/>
+            <a:r>
+              <a:rPr kumimoji="0" lang="en-US" sz="3200" kern="1200" dirty="0" smtClean="0">
+                <a:solidFill>
+                  <a:schemeClr val="tx1"/>
+                </a:solidFill>
+                <a:latin typeface="+mn-lt"/>
+                <a:ea typeface="+mn-ea"/>
+                <a:cs typeface="+mn-cs"/>
+              </a:rPr>
               <a:t>@Rule specifies a single grammar rule.</a:t>
             </a:r>
+            <a:endParaRPr lang="en-US" sz="3200" dirty="0" smtClean="0"/>
+          </a:p>
+          <a:p>
+            <a:pPr lvl="1" rtl="0" eaLnBrk="1" latinLnBrk="0" hangingPunct="1"/>
+            <a:r>
+              <a:rPr kumimoji="0" lang="en-US" sz="2800" kern="1200" dirty="0" err="1" smtClean="0">
+                <a:solidFill>
+                  <a:schemeClr val="tx1"/>
+                </a:solidFill>
+                <a:latin typeface="+mn-lt"/>
+                <a:ea typeface="+mn-ea"/>
+                <a:cs typeface="+mn-cs"/>
+              </a:rPr>
+              <a:t>args</a:t>
+            </a:r>
+            <a:r>
+              <a:rPr kumimoji="0" lang="en-US" sz="2800" kern="1200" dirty="0" smtClean="0">
+                <a:solidFill>
+                  <a:schemeClr val="tx1"/>
+                </a:solidFill>
+                <a:latin typeface="+mn-lt"/>
+                <a:ea typeface="+mn-ea"/>
+                <a:cs typeface="+mn-cs"/>
+              </a:rPr>
+              <a:t> specifies the arguments to be passed to the function</a:t>
+            </a:r>
+            <a:endParaRPr lang="en-US" sz="800" dirty="0" smtClean="0"/>
+          </a:p>
+          <a:p>
+            <a:pPr rtl="0" eaLnBrk="1" latinLnBrk="0" hangingPunct="1"/>
+            <a:r>
+              <a:rPr kumimoji="0" lang="en-US" sz="3200" kern="1200" dirty="0" smtClean="0">
+                <a:solidFill>
+                  <a:schemeClr val="tx1"/>
+                </a:solidFill>
+                <a:latin typeface="+mn-lt"/>
+                <a:ea typeface="+mn-ea"/>
+                <a:cs typeface="+mn-cs"/>
+              </a:rPr>
+              <a:t>Advantages</a:t>
+            </a:r>
           </a:p>
           <a:p>
             <a:pPr lvl="1"/>
             <a:r>
-              <a:rPr lang="en-US" sz="1200" dirty="0" err="1" smtClean="0"/>
-              <a:t>args</a:t>
-            </a:r>
-            <a:r>
-              <a:rPr lang="en-US" sz="1200" dirty="0" smtClean="0"/>
-              <a:t> specifies the arguments to be passed to the function</a:t>
-            </a:r>
-          </a:p>
-          <a:p>
-            <a:pPr lvl="1"/>
-            <a:r>
-              <a:rPr lang="en-US" sz="1200" dirty="0" smtClean="0"/>
-              <a:t>The return value from the function is the value to be assigned to the LHS non-terminal.</a:t>
-            </a:r>
-          </a:p>
-          <a:p>
-            <a:r>
-              <a:rPr lang="en-US" sz="1600" dirty="0" smtClean="0"/>
-              <a:t>Advantages:</a:t>
-            </a:r>
-            <a:endParaRPr lang="en-US" sz="1200" dirty="0"/>
-          </a:p>
-          <a:p>
-            <a:pPr lvl="1"/>
-            <a:r>
-              <a:rPr lang="en-US" sz="1200" dirty="0" smtClean="0"/>
+              <a:rPr kumimoji="0" lang="en-US" sz="2800" kern="1200" dirty="0" smtClean="0">
+                <a:solidFill>
+                  <a:schemeClr val="tx1"/>
+                </a:solidFill>
+                <a:latin typeface="+mn-lt"/>
+                <a:ea typeface="+mn-ea"/>
+                <a:cs typeface="+mn-cs"/>
+              </a:rPr>
               <a:t>No more cryptic names like $1 $2 or having to specify the types of the variable elsewhere.</a:t>
             </a:r>
-          </a:p>
-          <a:p>
-            <a:pPr lvl="1"/>
-            <a:r>
-              <a:rPr lang="en-US" sz="1200" dirty="0" smtClean="0"/>
-              <a:t>Can fully take advantage of the IDE</a:t>
-            </a:r>
-          </a:p>
-          <a:p>
-            <a:pPr lvl="1"/>
-            <a:r>
-              <a:rPr lang="en-US" sz="1200" dirty="0" smtClean="0"/>
-              <a:t>Documentation is easier since comments (in this case </a:t>
-            </a:r>
-            <a:r>
-              <a:rPr lang="en-US" sz="1200" dirty="0" err="1" smtClean="0"/>
-              <a:t>JavaDoc</a:t>
-            </a:r>
-            <a:r>
-              <a:rPr lang="en-US" sz="1200" dirty="0"/>
-              <a:t> </a:t>
-            </a:r>
-            <a:r>
-              <a:rPr lang="en-US" sz="1200" dirty="0" smtClean="0"/>
-              <a:t>comments) can be added to the function and extracted using generic documentation tools.</a:t>
-            </a:r>
-            <a:endParaRPr lang="en-US" sz="1200" dirty="0"/>
+            <a:endParaRPr lang="en-US" sz="800" dirty="0"/>
           </a:p>
         </p:txBody>
       </p:sp>
@@ -6234,6 +6219,414 @@
           <a:p>
             <a:r>
               <a:rPr lang="en-US" dirty="0" smtClean="0"/>
+              <a:t>Parser Function Case 1</a:t>
+            </a:r>
+            <a:endParaRPr lang="en-US" dirty="0"/>
+          </a:p>
+        </p:txBody>
+      </p:sp>
+      <p:sp>
+        <p:nvSpPr>
+          <p:cNvPr id="3" name="Content Placeholder 2"/>
+          <p:cNvSpPr>
+            <a:spLocks noGrp="1"/>
+          </p:cNvSpPr>
+          <p:nvPr>
+            <p:ph idx="1"/>
+          </p:nvPr>
+        </p:nvSpPr>
+        <p:spPr/>
+        <p:txBody>
+          <a:bodyPr/>
+          <a:lstStyle/>
+          <a:p>
+            <a:r>
+              <a:rPr lang="en-US" dirty="0" smtClean="0"/>
+              <a:t>Function returns void</a:t>
+            </a:r>
+          </a:p>
+          <a:p>
+            <a:pPr lvl="1"/>
+            <a:r>
+              <a:rPr lang="en-US" dirty="0" smtClean="0"/>
+              <a:t>The </a:t>
+            </a:r>
+            <a:r>
+              <a:rPr lang="en-US" dirty="0" smtClean="0"/>
+              <a:t>value associated with the non-terminal of the LHS is null.</a:t>
+            </a:r>
+            <a:endParaRPr lang="en-US" dirty="0"/>
+          </a:p>
+        </p:txBody>
+      </p:sp>
+      <p:pic>
+        <p:nvPicPr>
+          <p:cNvPr id="1026" name="Picture 2"/>
+          <p:cNvPicPr>
+            <a:picLocks noChangeAspect="1" noChangeArrowheads="1"/>
+          </p:cNvPicPr>
+          <p:nvPr/>
+        </p:nvPicPr>
+        <p:blipFill>
+          <a:blip r:embed="rId2"/>
+          <a:srcRect/>
+          <a:stretch>
+            <a:fillRect/>
+          </a:stretch>
+        </p:blipFill>
+        <p:spPr bwMode="auto">
+          <a:xfrm>
+            <a:off x="2209800" y="4191000"/>
+            <a:ext cx="4434052" cy="1285875"/>
+          </a:xfrm>
+          <a:prstGeom prst="rect">
+            <a:avLst/>
+          </a:prstGeom>
+          <a:noFill/>
+          <a:ln w="9525">
+            <a:noFill/>
+            <a:miter lim="800000"/>
+            <a:headEnd/>
+            <a:tailEnd/>
+          </a:ln>
+          <a:effectLst/>
+        </p:spPr>
+      </p:pic>
+    </p:spTree>
+  </p:cSld>
+  <p:clrMapOvr>
+    <a:masterClrMapping/>
+  </p:clrMapOvr>
+  <p:timing>
+    <p:tnLst>
+      <p:par>
+        <p:cTn id="1" dur="indefinite" restart="never" nodeType="tmRoot"/>
+      </p:par>
+    </p:tnLst>
+  </p:timing>
+</p:sld>
+</file>
+
+<file path=ppt/slides/slide21.xml><?xml version="1.0" encoding="utf-8"?>
+<p:sld xmlns:a="http://schemas.openxmlformats.org/drawingml/2006/main" xmlns:r="http://schemas.openxmlformats.org/officeDocument/2006/relationships" xmlns:p="http://schemas.openxmlformats.org/presentationml/2006/main">
+  <p:cSld>
+    <p:spTree>
+      <p:nvGrpSpPr>
+        <p:cNvPr id="1" name=""/>
+        <p:cNvGrpSpPr/>
+        <p:nvPr/>
+      </p:nvGrpSpPr>
+      <p:grpSpPr>
+        <a:xfrm>
+          <a:off x="0" y="0"/>
+          <a:ext cx="0" cy="0"/>
+          <a:chOff x="0" y="0"/>
+          <a:chExt cx="0" cy="0"/>
+        </a:xfrm>
+      </p:grpSpPr>
+      <p:sp>
+        <p:nvSpPr>
+          <p:cNvPr id="2" name="Title 1"/>
+          <p:cNvSpPr>
+            <a:spLocks noGrp="1"/>
+          </p:cNvSpPr>
+          <p:nvPr>
+            <p:ph type="title"/>
+          </p:nvPr>
+        </p:nvSpPr>
+        <p:spPr/>
+        <p:txBody>
+          <a:bodyPr/>
+          <a:lstStyle/>
+          <a:p>
+            <a:r>
+              <a:rPr lang="en-US" dirty="0" smtClean="0"/>
+              <a:t>Parser Function Case</a:t>
+            </a:r>
+            <a:r>
+              <a:rPr lang="en-US" baseline="0" dirty="0" smtClean="0"/>
+              <a:t> 2</a:t>
+            </a:r>
+            <a:endParaRPr lang="en-US" dirty="0"/>
+          </a:p>
+        </p:txBody>
+      </p:sp>
+      <p:sp>
+        <p:nvSpPr>
+          <p:cNvPr id="3" name="Content Placeholder 2"/>
+          <p:cNvSpPr>
+            <a:spLocks noGrp="1"/>
+          </p:cNvSpPr>
+          <p:nvPr>
+            <p:ph idx="1"/>
+          </p:nvPr>
+        </p:nvSpPr>
+        <p:spPr/>
+        <p:txBody>
+          <a:bodyPr/>
+          <a:lstStyle/>
+          <a:p>
+            <a:r>
+              <a:rPr lang="en-US" dirty="0" smtClean="0"/>
+              <a:t>Function returns a non-</a:t>
+            </a:r>
+            <a:r>
+              <a:rPr lang="en-US" dirty="0" err="1" smtClean="0"/>
+              <a:t>int</a:t>
+            </a:r>
+            <a:r>
+              <a:rPr lang="en-US" dirty="0" smtClean="0"/>
+              <a:t> value</a:t>
+            </a:r>
+          </a:p>
+          <a:p>
+            <a:pPr lvl="1"/>
+            <a:r>
+              <a:rPr lang="en-US" dirty="0" smtClean="0"/>
+              <a:t>The </a:t>
+            </a:r>
+            <a:r>
+              <a:rPr lang="en-US" dirty="0" smtClean="0"/>
+              <a:t>return value is automatically associated with the non-terminal on the LHS.</a:t>
+            </a:r>
+            <a:endParaRPr lang="en-US" dirty="0"/>
+          </a:p>
+        </p:txBody>
+      </p:sp>
+      <p:pic>
+        <p:nvPicPr>
+          <p:cNvPr id="2050" name="Picture 2"/>
+          <p:cNvPicPr>
+            <a:picLocks noChangeAspect="1" noChangeArrowheads="1"/>
+          </p:cNvPicPr>
+          <p:nvPr/>
+        </p:nvPicPr>
+        <p:blipFill>
+          <a:blip r:embed="rId2"/>
+          <a:srcRect/>
+          <a:stretch>
+            <a:fillRect/>
+          </a:stretch>
+        </p:blipFill>
+        <p:spPr bwMode="auto">
+          <a:xfrm>
+            <a:off x="1447800" y="3581400"/>
+            <a:ext cx="5589127" cy="2305050"/>
+          </a:xfrm>
+          <a:prstGeom prst="rect">
+            <a:avLst/>
+          </a:prstGeom>
+          <a:noFill/>
+          <a:ln w="9525">
+            <a:noFill/>
+            <a:miter lim="800000"/>
+            <a:headEnd/>
+            <a:tailEnd/>
+          </a:ln>
+          <a:effectLst/>
+        </p:spPr>
+      </p:pic>
+    </p:spTree>
+  </p:cSld>
+  <p:clrMapOvr>
+    <a:masterClrMapping/>
+  </p:clrMapOvr>
+  <p:timing>
+    <p:tnLst>
+      <p:par>
+        <p:cTn id="1" dur="indefinite" restart="never" nodeType="tmRoot"/>
+      </p:par>
+    </p:tnLst>
+  </p:timing>
+</p:sld>
+</file>
+
+<file path=ppt/slides/slide22.xml><?xml version="1.0" encoding="utf-8"?>
+<p:sld xmlns:a="http://schemas.openxmlformats.org/drawingml/2006/main" xmlns:r="http://schemas.openxmlformats.org/officeDocument/2006/relationships" xmlns:p="http://schemas.openxmlformats.org/presentationml/2006/main">
+  <p:cSld>
+    <p:spTree>
+      <p:nvGrpSpPr>
+        <p:cNvPr id="1" name=""/>
+        <p:cNvGrpSpPr/>
+        <p:nvPr/>
+      </p:nvGrpSpPr>
+      <p:grpSpPr>
+        <a:xfrm>
+          <a:off x="0" y="0"/>
+          <a:ext cx="0" cy="0"/>
+          <a:chOff x="0" y="0"/>
+          <a:chExt cx="0" cy="0"/>
+        </a:xfrm>
+      </p:grpSpPr>
+      <p:sp>
+        <p:nvSpPr>
+          <p:cNvPr id="2" name="Title 1"/>
+          <p:cNvSpPr>
+            <a:spLocks noGrp="1"/>
+          </p:cNvSpPr>
+          <p:nvPr>
+            <p:ph type="title"/>
+          </p:nvPr>
+        </p:nvSpPr>
+        <p:spPr/>
+        <p:txBody>
+          <a:bodyPr/>
+          <a:lstStyle/>
+          <a:p>
+            <a:r>
+              <a:rPr lang="en-US" dirty="0" smtClean="0"/>
+              <a:t>Parser Function Case</a:t>
+            </a:r>
+            <a:r>
+              <a:rPr lang="en-US" baseline="0" dirty="0" smtClean="0"/>
+              <a:t> 3</a:t>
+            </a:r>
+            <a:endParaRPr lang="en-US" dirty="0"/>
+          </a:p>
+        </p:txBody>
+      </p:sp>
+      <p:sp>
+        <p:nvSpPr>
+          <p:cNvPr id="3" name="Content Placeholder 2"/>
+          <p:cNvSpPr>
+            <a:spLocks noGrp="1"/>
+          </p:cNvSpPr>
+          <p:nvPr>
+            <p:ph idx="1"/>
+          </p:nvPr>
+        </p:nvSpPr>
+        <p:spPr>
+          <a:xfrm>
+            <a:off x="457200" y="1676400"/>
+            <a:ext cx="8229600" cy="2339609"/>
+          </a:xfrm>
+        </p:spPr>
+        <p:txBody>
+          <a:bodyPr>
+            <a:normAutofit fontScale="92500"/>
+          </a:bodyPr>
+          <a:lstStyle/>
+          <a:p>
+            <a:r>
+              <a:rPr lang="en-US" dirty="0" smtClean="0"/>
+              <a:t>Function returns an </a:t>
+            </a:r>
+            <a:r>
+              <a:rPr lang="en-US" dirty="0" err="1" smtClean="0"/>
+              <a:t>int</a:t>
+            </a:r>
+            <a:r>
+              <a:rPr lang="en-US" dirty="0" smtClean="0"/>
+              <a:t> value</a:t>
+            </a:r>
+          </a:p>
+          <a:p>
+            <a:pPr lvl="1"/>
+            <a:r>
+              <a:rPr lang="en-US" dirty="0" smtClean="0"/>
+              <a:t>This function is used by the grammar start non-terminal to signal the exit of the parser with the particular </a:t>
+            </a:r>
+            <a:r>
+              <a:rPr lang="en-US" dirty="0" smtClean="0"/>
+              <a:t>value.</a:t>
+            </a:r>
+          </a:p>
+          <a:p>
+            <a:pPr lvl="1"/>
+            <a:r>
+              <a:rPr lang="en-US" dirty="0" smtClean="0"/>
+              <a:t>It </a:t>
+            </a:r>
+            <a:r>
+              <a:rPr lang="en-US" dirty="0" smtClean="0"/>
+              <a:t>can be used by error processing functions as well.</a:t>
+            </a:r>
+            <a:endParaRPr lang="en-US" dirty="0"/>
+          </a:p>
+        </p:txBody>
+      </p:sp>
+      <p:pic>
+        <p:nvPicPr>
+          <p:cNvPr id="3074" name="Picture 2"/>
+          <p:cNvPicPr>
+            <a:picLocks noChangeAspect="1" noChangeArrowheads="1"/>
+          </p:cNvPicPr>
+          <p:nvPr/>
+        </p:nvPicPr>
+        <p:blipFill>
+          <a:blip r:embed="rId2"/>
+          <a:srcRect/>
+          <a:stretch>
+            <a:fillRect/>
+          </a:stretch>
+        </p:blipFill>
+        <p:spPr bwMode="auto">
+          <a:xfrm>
+            <a:off x="914400" y="3962400"/>
+            <a:ext cx="7169287" cy="2552700"/>
+          </a:xfrm>
+          <a:prstGeom prst="rect">
+            <a:avLst/>
+          </a:prstGeom>
+          <a:noFill/>
+          <a:ln w="9525">
+            <a:noFill/>
+            <a:miter lim="800000"/>
+            <a:headEnd/>
+            <a:tailEnd/>
+          </a:ln>
+          <a:effectLst/>
+        </p:spPr>
+      </p:pic>
+    </p:spTree>
+  </p:cSld>
+  <p:clrMapOvr>
+    <a:masterClrMapping/>
+  </p:clrMapOvr>
+  <p:timing>
+    <p:tnLst>
+      <p:par>
+        <p:cTn id="1" dur="indefinite" restart="never" nodeType="tmRoot"/>
+      </p:par>
+    </p:tnLst>
+  </p:timing>
+</p:sld>
+</file>
+
+<file path=ppt/slides/slide23.xml><?xml version="1.0" encoding="utf-8"?>
+<p:sld xmlns:a="http://schemas.openxmlformats.org/drawingml/2006/main" xmlns:r="http://schemas.openxmlformats.org/officeDocument/2006/relationships" xmlns:p="http://schemas.openxmlformats.org/presentationml/2006/main">
+  <p:cSld>
+    <p:spTree>
+      <p:nvGrpSpPr>
+        <p:cNvPr id="1" name=""/>
+        <p:cNvGrpSpPr/>
+        <p:nvPr/>
+      </p:nvGrpSpPr>
+      <p:grpSpPr>
+        <a:xfrm>
+          <a:off x="0" y="0"/>
+          <a:ext cx="0" cy="0"/>
+          <a:chOff x="0" y="0"/>
+          <a:chExt cx="0" cy="0"/>
+        </a:xfrm>
+      </p:grpSpPr>
+      <p:sp>
+        <p:nvSpPr>
+          <p:cNvPr id="2" name="Title 1"/>
+          <p:cNvSpPr>
+            <a:spLocks noGrp="1"/>
+          </p:cNvSpPr>
+          <p:nvPr>
+            <p:ph type="title"/>
+          </p:nvPr>
+        </p:nvSpPr>
+        <p:spPr/>
+        <p:txBody>
+          <a:bodyPr/>
+          <a:lstStyle/>
+          <a:p>
+            <a:r>
+              <a:rPr lang="en-US" dirty="0" smtClean="0"/>
               <a:t>More Parser Annotations</a:t>
             </a:r>
             <a:endParaRPr lang="en-US" dirty="0"/>
@@ -6258,7 +6651,7 @@
         </p:spPr>
         <p:txBody>
           <a:bodyPr>
-            <a:normAutofit lnSpcReduction="10000"/>
+            <a:normAutofit fontScale="92500" lnSpcReduction="10000"/>
           </a:bodyPr>
           <a:lstStyle/>
           <a:p>
@@ -6308,10 +6701,17 @@
   <p:clrMapOvr>
     <a:masterClrMapping/>
   </p:clrMapOvr>
+  <p:timing>
+    <p:tnLst>
+      <p:par>
+        <p:cTn id="1" dur="indefinite" restart="never" nodeType="tmRoot"/>
+      </p:par>
+    </p:tnLst>
+  </p:timing>
 </p:sld>
 </file>
 
-<file path=ppt/slides/slide21.xml><?xml version="1.0" encoding="utf-8"?>
+<file path=ppt/slides/slide24.xml><?xml version="1.0" encoding="utf-8"?>
 <p:sld xmlns:a="http://schemas.openxmlformats.org/drawingml/2006/main" xmlns:r="http://schemas.openxmlformats.org/officeDocument/2006/relationships" xmlns:p="http://schemas.openxmlformats.org/presentationml/2006/main">
   <p:cSld>
     <p:spTree>
@@ -6417,8 +6817,13 @@
             </a:r>
             <a:r>
               <a:rPr lang="en-US" dirty="0" smtClean="0"/>
-              <a:t> only parser</a:t>
-            </a:r>
+              <a:t> only </a:t>
+            </a:r>
+            <a:r>
+              <a:rPr lang="en-US" dirty="0" smtClean="0"/>
+              <a:t>scanner</a:t>
+            </a:r>
+            <a:endParaRPr lang="en-US" dirty="0" smtClean="0"/>
           </a:p>
           <a:p>
             <a:r>
@@ -6471,10 +6876,17 @@
   <p:clrMapOvr>
     <a:masterClrMapping/>
   </p:clrMapOvr>
+  <p:timing>
+    <p:tnLst>
+      <p:par>
+        <p:cTn id="1" dur="indefinite" restart="never" nodeType="tmRoot"/>
+      </p:par>
+    </p:tnLst>
+  </p:timing>
 </p:sld>
 </file>
 
-<file path=ppt/slides/slide22.xml><?xml version="1.0" encoding="utf-8"?>
+<file path=ppt/slides/slide25.xml><?xml version="1.0" encoding="utf-8"?>
 <p:sld xmlns:a="http://schemas.openxmlformats.org/drawingml/2006/main" xmlns:r="http://schemas.openxmlformats.org/officeDocument/2006/relationships" xmlns:p="http://schemas.openxmlformats.org/presentationml/2006/main">
   <p:cSld>
     <p:spTree>
@@ -6539,11 +6951,7 @@
             </a:r>
             <a:r>
               <a:rPr lang="en-US" dirty="0" smtClean="0"/>
-              <a:t> as the processor to generate the class needed</a:t>
-            </a:r>
-            <a:r>
-              <a:rPr lang="en-US" dirty="0" smtClean="0"/>
-              <a:t>.</a:t>
+              <a:t> as the processor to generate the class needed.</a:t>
             </a:r>
           </a:p>
           <a:p>
@@ -6583,10 +6991,6 @@
               </a:rPr>
               <a:t> cookcc.jar;. Calculator.java</a:t>
             </a:r>
-            <a:endParaRPr lang="en-US" sz="2000" dirty="0" smtClean="0">
-              <a:latin typeface="Courier New" pitchFamily="49" charset="0"/>
-              <a:cs typeface="Courier New" pitchFamily="49" charset="0"/>
-            </a:endParaRPr>
           </a:p>
           <a:p>
             <a:r>
@@ -6599,21 +7003,8 @@
             </a:r>
             <a:r>
               <a:rPr lang="en-US" dirty="0" smtClean="0"/>
-              <a:t>/parse </a:t>
-            </a:r>
-            <a:r>
-              <a:rPr lang="en-US" dirty="0" smtClean="0"/>
-              <a:t>patterns/rules </a:t>
-            </a:r>
-            <a:r>
-              <a:rPr lang="en-US" dirty="0" smtClean="0"/>
-              <a:t>are changed, it is not necessary to re-generate new </a:t>
-            </a:r>
-            <a:r>
-              <a:rPr lang="en-US" dirty="0" smtClean="0"/>
-              <a:t>classes.</a:t>
-            </a:r>
-            <a:endParaRPr lang="en-US" dirty="0" smtClean="0"/>
+              <a:t>/parse patterns/rules are changed, it is not necessary to re-generate new classes.</a:t>
+            </a:r>
           </a:p>
           <a:p>
             <a:r>
@@ -6628,7 +7019,6 @@
               <a:rPr lang="en-US" dirty="0" smtClean="0"/>
               <a:t> at anytime.</a:t>
             </a:r>
-            <a:endParaRPr lang="en-US" dirty="0" smtClean="0"/>
           </a:p>
         </p:txBody>
       </p:sp>
@@ -6647,7 +7037,7 @@
 </p:sld>
 </file>
 
-<file path=ppt/slides/slide23.xml><?xml version="1.0" encoding="utf-8"?>
+<file path=ppt/slides/slide26.xml><?xml version="1.0" encoding="utf-8"?>
 <p:sld xmlns:a="http://schemas.openxmlformats.org/drawingml/2006/main" xmlns:r="http://schemas.openxmlformats.org/officeDocument/2006/relationships" xmlns:p="http://schemas.openxmlformats.org/presentationml/2006/main">
   <p:cSld>
     <p:spTree>
@@ -6822,10 +7212,17 @@
   <p:clrMapOvr>
     <a:masterClrMapping/>
   </p:clrMapOvr>
+  <p:timing>
+    <p:tnLst>
+      <p:par>
+        <p:cTn id="1" dur="indefinite" restart="never" nodeType="tmRoot"/>
+      </p:par>
+    </p:tnLst>
+  </p:timing>
 </p:sld>
 </file>
 
-<file path=ppt/slides/slide24.xml><?xml version="1.0" encoding="utf-8"?>
+<file path=ppt/slides/slide27.xml><?xml version="1.0" encoding="utf-8"?>
 <p:sld xmlns:a="http://schemas.openxmlformats.org/drawingml/2006/main" xmlns:r="http://schemas.openxmlformats.org/officeDocument/2006/relationships" xmlns:p="http://schemas.openxmlformats.org/presentationml/2006/main">
   <p:cSld>
     <p:spTree>
@@ -6926,10 +7323,17 @@
   <p:clrMapOvr>
     <a:masterClrMapping/>
   </p:clrMapOvr>
+  <p:timing>
+    <p:tnLst>
+      <p:par>
+        <p:cTn id="1" dur="indefinite" restart="never" nodeType="tmRoot"/>
+      </p:par>
+    </p:tnLst>
+  </p:timing>
 </p:sld>
 </file>
 
-<file path=ppt/slides/slide25.xml><?xml version="1.0" encoding="utf-8"?>
+<file path=ppt/slides/slide28.xml><?xml version="1.0" encoding="utf-8"?>
 <p:sld xmlns:a="http://schemas.openxmlformats.org/drawingml/2006/main" xmlns:r="http://schemas.openxmlformats.org/officeDocument/2006/relationships" xmlns:p="http://schemas.openxmlformats.org/presentationml/2006/main">
   <p:cSld>
     <p:spTree>
@@ -7019,11 +7423,7 @@
             <a:pPr lvl="2"/>
             <a:r>
               <a:rPr lang="en-US" dirty="0" smtClean="0"/>
-              <a:t>Uses Python doc </a:t>
-            </a:r>
-            <a:r>
-              <a:rPr lang="en-US" dirty="0" smtClean="0"/>
-              <a:t>string to specify the </a:t>
+              <a:t>Uses Python doc string to specify the </a:t>
             </a:r>
             <a:r>
               <a:rPr lang="en-US" dirty="0" err="1" smtClean="0"/>
@@ -7031,11 +7431,7 @@
             </a:r>
             <a:r>
               <a:rPr lang="en-US" dirty="0" smtClean="0"/>
-              <a:t> / parser</a:t>
-            </a:r>
-            <a:r>
-              <a:rPr lang="en-US" dirty="0" smtClean="0"/>
-              <a:t>.</a:t>
+              <a:t> / parser.</a:t>
             </a:r>
           </a:p>
           <a:p>
@@ -7048,7 +7444,6 @@
               <a:rPr lang="en-US" dirty="0" smtClean="0"/>
               <a:t>, J. "Compiling Little Languages in Python", Proceedings of the Seventh International Python Conference, p100, 1998.</a:t>
             </a:r>
-            <a:endParaRPr lang="en-US" dirty="0" smtClean="0"/>
           </a:p>
         </p:txBody>
       </p:sp>
@@ -7067,7 +7462,7 @@
 </p:sld>
 </file>
 
-<file path=ppt/slides/slide26.xml><?xml version="1.0" encoding="utf-8"?>
+<file path=ppt/slides/slide29.xml><?xml version="1.0" encoding="utf-8"?>
 <p:sld xmlns:a="http://schemas.openxmlformats.org/drawingml/2006/main" xmlns:r="http://schemas.openxmlformats.org/officeDocument/2006/relationships" xmlns:p="http://schemas.openxmlformats.org/presentationml/2006/main">
   <p:cSld>
     <p:spTree>
@@ -7105,11 +7500,7 @@
             </a:r>
             <a:r>
               <a:rPr lang="en-US" dirty="0" smtClean="0"/>
-              <a:t> </a:t>
-            </a:r>
-            <a:r>
-              <a:rPr lang="en-US" dirty="0" smtClean="0"/>
-              <a:t>Web Site</a:t>
+              <a:t> Web Site</a:t>
             </a:r>
             <a:endParaRPr lang="en-US" dirty="0"/>
           </a:p>
@@ -7141,13 +7532,7 @@
               <a:rPr lang="en-US" dirty="0" smtClean="0">
                 <a:hlinkClick r:id="rId2"/>
               </a:rPr>
-              <a:t>http://code.google.com/p/cookcc</a:t>
-            </a:r>
-            <a:r>
-              <a:rPr lang="en-US" dirty="0" smtClean="0">
-                <a:hlinkClick r:id="rId2"/>
-              </a:rPr>
-              <a:t>/</a:t>
+              <a:t>http://code.google.com/p/cookcc/</a:t>
             </a:r>
             <a:endParaRPr lang="en-US" dirty="0" smtClean="0"/>
           </a:p>
@@ -7174,6 +7559,13 @@
   <p:clrMapOvr>
     <a:masterClrMapping/>
   </p:clrMapOvr>
+  <p:timing>
+    <p:tnLst>
+      <p:par>
+        <p:cTn id="1" dur="indefinite" restart="never" nodeType="tmRoot"/>
+      </p:par>
+    </p:tnLst>
+  </p:timing>
 </p:sld>
 </file>
 
@@ -7370,13 +7762,17 @@
             <a:pPr lvl="2"/>
             <a:r>
               <a:rPr lang="en-US" dirty="0" smtClean="0"/>
-              <a:t>No syntax highlighting</a:t>
+              <a:t>No syntax </a:t>
+            </a:r>
+            <a:r>
+              <a:rPr lang="en-US" dirty="0" smtClean="0"/>
+              <a:t>highlighting</a:t>
             </a:r>
           </a:p>
           <a:p>
             <a:pPr lvl="2"/>
             <a:r>
-              <a:rPr kumimoji="0" lang="en-US" sz="2400" kern="1200" dirty="0" smtClean="0">
+              <a:rPr kumimoji="0" lang="en-US" sz="2000" kern="1200" dirty="0" smtClean="0">
                 <a:solidFill>
                   <a:schemeClr val="tx1"/>
                 </a:solidFill>
@@ -8141,14 +8537,7 @@
                 <a:latin typeface="Courier New" pitchFamily="49" charset="0"/>
                 <a:cs typeface="Courier New" pitchFamily="49" charset="0"/>
               </a:rPr>
-              <a:t>                    for </a:t>
-            </a:r>
-            <a:r>
-              <a:rPr lang="en-US" dirty="0" smtClean="0">
-                <a:latin typeface="Courier New" pitchFamily="49" charset="0"/>
-                <a:cs typeface="Courier New" pitchFamily="49" charset="0"/>
-              </a:rPr>
-              <a:t>( </a:t>
+              <a:t>                    for ( </a:t>
             </a:r>
             <a:r>
               <a:rPr lang="en-US" dirty="0" err="1" smtClean="0">
@@ -8810,11 +9199,7 @@
           <a:p>
             <a:r>
               <a:rPr lang="en-US" dirty="0" smtClean="0"/>
-              <a:t>Partial </a:t>
-            </a:r>
-            <a:r>
-              <a:rPr lang="en-US" dirty="0" smtClean="0"/>
-              <a:t>Solutions</a:t>
+              <a:t>Partial Solutions</a:t>
             </a:r>
             <a:endParaRPr lang="en-US" dirty="0"/>
           </a:p>
@@ -8844,15 +9229,7 @@
             <a:pPr lvl="1"/>
             <a:r>
               <a:rPr lang="en-US" dirty="0" smtClean="0"/>
-              <a:t>Solves </a:t>
-            </a:r>
-            <a:r>
-              <a:rPr lang="en-US" dirty="0" smtClean="0"/>
-              <a:t>the problem related to file </a:t>
-            </a:r>
-            <a:r>
-              <a:rPr lang="en-US" dirty="0" smtClean="0"/>
-              <a:t>format.</a:t>
+              <a:t>Solves the problem related to file format.</a:t>
             </a:r>
           </a:p>
           <a:p>
@@ -8873,15 +9250,7 @@
             <a:pPr lvl="1"/>
             <a:r>
               <a:rPr lang="en-US" dirty="0" smtClean="0"/>
-              <a:t>Still do not solve other </a:t>
-            </a:r>
-            <a:r>
-              <a:rPr lang="en-US" dirty="0" smtClean="0"/>
-              <a:t>problems</a:t>
-            </a:r>
-            <a:r>
-              <a:rPr lang="en-US" dirty="0" smtClean="0"/>
-              <a:t>.</a:t>
+              <a:t>Still do not solve other problems.</a:t>
             </a:r>
           </a:p>
           <a:p>
@@ -8971,11 +9340,19 @@
             </a:r>
             <a:r>
               <a:rPr lang="en-US" dirty="0" err="1" smtClean="0"/>
-              <a:t>Lexr</a:t>
-            </a:r>
-            <a:r>
-              <a:rPr lang="en-US" dirty="0" smtClean="0"/>
-              <a:t> / Parser w/ Annotation</a:t>
+              <a:t>Lexer</a:t>
+            </a:r>
+            <a:r>
+              <a:rPr lang="en-US" dirty="0" smtClean="0"/>
+              <a:t> </a:t>
+            </a:r>
+            <a:r>
+              <a:rPr lang="en-US" dirty="0" smtClean="0"/>
+              <a:t>/ Parser </a:t>
+            </a:r>
+            <a:r>
+              <a:rPr lang="en-US" dirty="0" smtClean="0"/>
+              <a:t>using Annotations</a:t>
             </a:r>
             <a:endParaRPr lang="en-US" dirty="0"/>
           </a:p>
@@ -9021,13 +9398,8 @@
             <a:pPr lvl="2"/>
             <a:r>
               <a:rPr lang="en-US" dirty="0" smtClean="0"/>
-              <a:t>Context sensitive </a:t>
-            </a:r>
-            <a:r>
-              <a:rPr lang="en-US" dirty="0" smtClean="0"/>
-              <a:t>hints</a:t>
-            </a:r>
-            <a:endParaRPr lang="en-US" dirty="0" smtClean="0"/>
+              <a:t>Context sensitive hints</a:t>
+            </a:r>
           </a:p>
           <a:p>
             <a:pPr lvl="2"/>
@@ -9049,7 +9421,6 @@
               <a:rPr lang="en-US" dirty="0" smtClean="0"/>
               <a:t>Auto-completion</a:t>
             </a:r>
-            <a:endParaRPr lang="en-US" dirty="0" smtClean="0"/>
           </a:p>
           <a:p>
             <a:pPr lvl="2"/>
@@ -9064,7 +9435,6 @@
               <a:rPr lang="en-US" dirty="0" smtClean="0"/>
               <a:t>etc</a:t>
             </a:r>
-            <a:endParaRPr lang="en-US" dirty="0" smtClean="0"/>
           </a:p>
           <a:p>
             <a:r>
@@ -9076,11 +9446,7 @@
             <a:pPr lvl="1"/>
             <a:r>
               <a:rPr lang="en-US" dirty="0" smtClean="0"/>
-              <a:t>Need to write a language specific annotation </a:t>
-            </a:r>
-            <a:r>
-              <a:rPr lang="en-US" dirty="0" smtClean="0"/>
-              <a:t>parser</a:t>
+              <a:t>Need to write a language specific annotation parser</a:t>
             </a:r>
           </a:p>
           <a:p>
@@ -9356,7 +9722,18 @@
             </a:r>
             <a:r>
               <a:rPr lang="en-US" dirty="0" smtClean="0"/>
-              <a:t> (for input file conversion)</a:t>
+              <a:t> (for input file conversion</a:t>
+            </a:r>
+            <a:r>
+              <a:rPr lang="en-US" dirty="0" smtClean="0"/>
+              <a:t>)</a:t>
+            </a:r>
+          </a:p>
+          <a:p>
+            <a:pPr lvl="1"/>
+            <a:r>
+              <a:rPr lang="en-US" dirty="0" smtClean="0"/>
+              <a:t>More output languages can be added</a:t>
             </a:r>
             <a:endParaRPr lang="en-US" dirty="0"/>
           </a:p>

</xml_diff>